<commit_message>
Updating Blackbox and ppt
</commit_message>
<xml_diff>
--- a/FinalV2/Team15.pptx
+++ b/FinalV2/Team15.pptx
@@ -2370,7 +2370,7 @@
           </a:ln>
           <a:extLst>
             <a:ext uri="{C572A759-6A51-4108-AA02-DFA0A04FC94B}">
-              <ma14:wrappingTextBoxFlag xmlns="" xmlns:m="http://schemas.openxmlformats.org/officeDocument/2006/math" xmlns:a14="http://schemas.microsoft.com/office/drawing/2010/main" xmlns:ma14="http://schemas.microsoft.com/office/mac/drawingml/2011/main" val="1"/>
+              <ma14:wrappingTextBoxFlag xmlns:ma14="http://schemas.microsoft.com/office/mac/drawingml/2011/main" xmlns:a14="http://schemas.microsoft.com/office/drawing/2010/main" xmlns:m="http://schemas.openxmlformats.org/officeDocument/2006/math" xmlns="" val="1"/>
             </a:ext>
           </a:extLst>
         </p:spPr>
@@ -2409,7 +2409,7 @@
           </a:ln>
           <a:extLst>
             <a:ext uri="{C572A759-6A51-4108-AA02-DFA0A04FC94B}">
-              <ma14:wrappingTextBoxFlag xmlns="" xmlns:m="http://schemas.openxmlformats.org/officeDocument/2006/math" xmlns:a14="http://schemas.microsoft.com/office/drawing/2010/main" xmlns:ma14="http://schemas.microsoft.com/office/mac/drawingml/2011/main" val="1"/>
+              <ma14:wrappingTextBoxFlag xmlns:ma14="http://schemas.microsoft.com/office/mac/drawingml/2011/main" xmlns:a14="http://schemas.microsoft.com/office/drawing/2010/main" xmlns:m="http://schemas.openxmlformats.org/officeDocument/2006/math" xmlns="" val="1"/>
             </a:ext>
           </a:extLst>
         </p:spPr>
@@ -3493,7 +3493,7 @@
           </a:ln>
           <a:extLst>
             <a:ext uri="{C572A759-6A51-4108-AA02-DFA0A04FC94B}">
-              <ma14:wrappingTextBoxFlag xmlns="" xmlns:m="http://schemas.openxmlformats.org/officeDocument/2006/math" xmlns:a14="http://schemas.microsoft.com/office/drawing/2010/main" xmlns:ma14="http://schemas.microsoft.com/office/mac/drawingml/2011/main" val="1"/>
+              <ma14:wrappingTextBoxFlag xmlns:ma14="http://schemas.microsoft.com/office/mac/drawingml/2011/main" xmlns:a14="http://schemas.microsoft.com/office/drawing/2010/main" xmlns:m="http://schemas.openxmlformats.org/officeDocument/2006/math" xmlns="" val="1"/>
             </a:ext>
           </a:extLst>
         </p:spPr>
@@ -3557,7 +3557,7 @@
           </a:ln>
           <a:extLst>
             <a:ext uri="{C572A759-6A51-4108-AA02-DFA0A04FC94B}">
-              <ma14:wrappingTextBoxFlag xmlns="" xmlns:m="http://schemas.openxmlformats.org/officeDocument/2006/math" xmlns:a14="http://schemas.microsoft.com/office/drawing/2010/main" xmlns:ma14="http://schemas.microsoft.com/office/mac/drawingml/2011/main" val="1"/>
+              <ma14:wrappingTextBoxFlag xmlns:ma14="http://schemas.microsoft.com/office/mac/drawingml/2011/main" xmlns:a14="http://schemas.microsoft.com/office/drawing/2010/main" xmlns:m="http://schemas.openxmlformats.org/officeDocument/2006/math" xmlns="" val="1"/>
             </a:ext>
           </a:extLst>
         </p:spPr>
@@ -4059,7 +4059,7 @@
           </a:ln>
           <a:extLst>
             <a:ext uri="{C572A759-6A51-4108-AA02-DFA0A04FC94B}">
-              <ma14:wrappingTextBoxFlag xmlns:ma14="http://schemas.microsoft.com/office/mac/drawingml/2011/main" xmlns:a14="http://schemas.microsoft.com/office/drawing/2010/main" xmlns:m="http://schemas.openxmlformats.org/officeDocument/2006/math" xmlns="" val="1"/>
+              <ma14:wrappingTextBoxFlag xmlns="" xmlns:m="http://schemas.openxmlformats.org/officeDocument/2006/math" xmlns:a14="http://schemas.microsoft.com/office/drawing/2010/main" xmlns:ma14="http://schemas.microsoft.com/office/mac/drawingml/2011/main" val="1"/>
             </a:ext>
           </a:extLst>
         </p:spPr>
@@ -4106,10 +4106,10 @@
       </p:sp>
       <p:pic>
         <p:nvPicPr>
-          <p:cNvPr id="3" name="Picture 2">
+          <p:cNvPr id="4" name="Picture 3">
             <a:extLst>
               <a:ext uri="{FF2B5EF4-FFF2-40B4-BE49-F238E27FC236}">
-                <a16:creationId xmlns:a16="http://schemas.microsoft.com/office/drawing/2014/main" id="{B017A668-6AF6-4035-A60D-82A52298A613}"/>
+                <a16:creationId xmlns:a16="http://schemas.microsoft.com/office/drawing/2014/main" id="{E89E7B25-9D46-4646-9374-966E16F5CF2E}"/>
               </a:ext>
             </a:extLst>
           </p:cNvPr>
@@ -4126,8 +4126,8 @@
         </p:blipFill>
         <p:spPr>
           <a:xfrm>
-            <a:off x="3941379" y="3256335"/>
-            <a:ext cx="16501242" cy="9137051"/>
+            <a:off x="3570011" y="3009780"/>
+            <a:ext cx="18470182" cy="9444979"/>
           </a:xfrm>
           <a:prstGeom prst="rect">
             <a:avLst/>
@@ -4199,7 +4199,7 @@
           </a:ln>
           <a:extLst>
             <a:ext uri="{C572A759-6A51-4108-AA02-DFA0A04FC94B}">
-              <ma14:wrappingTextBoxFlag xmlns:ma14="http://schemas.microsoft.com/office/mac/drawingml/2011/main" xmlns:a14="http://schemas.microsoft.com/office/drawing/2010/main" xmlns:m="http://schemas.openxmlformats.org/officeDocument/2006/math" xmlns="" val="1"/>
+              <ma14:wrappingTextBoxFlag xmlns="" xmlns:m="http://schemas.openxmlformats.org/officeDocument/2006/math" xmlns:a14="http://schemas.microsoft.com/office/drawing/2010/main" xmlns:ma14="http://schemas.microsoft.com/office/mac/drawingml/2011/main" val="1"/>
             </a:ext>
           </a:extLst>
         </p:spPr>
@@ -4330,7 +4330,7 @@
           </a:ln>
           <a:extLst>
             <a:ext uri="{C572A759-6A51-4108-AA02-DFA0A04FC94B}">
-              <ma14:wrappingTextBoxFlag xmlns="" xmlns:m="http://schemas.openxmlformats.org/officeDocument/2006/math" xmlns:a14="http://schemas.microsoft.com/office/drawing/2010/main" xmlns:ma14="http://schemas.microsoft.com/office/mac/drawingml/2011/main" val="1"/>
+              <ma14:wrappingTextBoxFlag xmlns:ma14="http://schemas.microsoft.com/office/mac/drawingml/2011/main" xmlns:a14="http://schemas.microsoft.com/office/drawing/2010/main" xmlns:m="http://schemas.openxmlformats.org/officeDocument/2006/math" xmlns="" val="1"/>
             </a:ext>
           </a:extLst>
         </p:spPr>
@@ -4461,7 +4461,7 @@
           </a:ln>
           <a:extLst>
             <a:ext uri="{C572A759-6A51-4108-AA02-DFA0A04FC94B}">
-              <ma14:wrappingTextBoxFlag xmlns:ma14="http://schemas.microsoft.com/office/mac/drawingml/2011/main" xmlns:a14="http://schemas.microsoft.com/office/drawing/2010/main" xmlns:m="http://schemas.openxmlformats.org/officeDocument/2006/math" xmlns="" val="1"/>
+              <ma14:wrappingTextBoxFlag xmlns="" xmlns:m="http://schemas.openxmlformats.org/officeDocument/2006/math" xmlns:a14="http://schemas.microsoft.com/office/drawing/2010/main" xmlns:ma14="http://schemas.microsoft.com/office/mac/drawingml/2011/main" val="1"/>
             </a:ext>
           </a:extLst>
         </p:spPr>
@@ -4659,7 +4659,7 @@
           </a:ln>
           <a:extLst>
             <a:ext uri="{C572A759-6A51-4108-AA02-DFA0A04FC94B}">
-              <ma14:wrappingTextBoxFlag xmlns="" xmlns:m="http://schemas.openxmlformats.org/officeDocument/2006/math" xmlns:a14="http://schemas.microsoft.com/office/drawing/2010/main" xmlns:ma14="http://schemas.microsoft.com/office/mac/drawingml/2011/main" val="1"/>
+              <ma14:wrappingTextBoxFlag xmlns:ma14="http://schemas.microsoft.com/office/mac/drawingml/2011/main" xmlns:a14="http://schemas.microsoft.com/office/drawing/2010/main" xmlns:m="http://schemas.openxmlformats.org/officeDocument/2006/math" xmlns="" val="1"/>
             </a:ext>
           </a:extLst>
         </p:spPr>

</xml_diff>